<commit_message>
generated xlsx files for tableau
</commit_message>
<xml_diff>
--- a/data/powerpoints/EOS-RTCC-Analysis.pptx
+++ b/data/powerpoints/EOS-RTCC-Analysis.pptx
@@ -7,11 +7,12 @@
   <p:sldIdLst>
     <p:sldId id="256" r:id="rId2"/>
     <p:sldId id="274" r:id="rId3"/>
-    <p:sldId id="275" r:id="rId4"/>
-    <p:sldId id="276" r:id="rId5"/>
-    <p:sldId id="279" r:id="rId6"/>
-    <p:sldId id="277" r:id="rId7"/>
-    <p:sldId id="278" r:id="rId8"/>
+    <p:sldId id="280" r:id="rId4"/>
+    <p:sldId id="275" r:id="rId5"/>
+    <p:sldId id="276" r:id="rId6"/>
+    <p:sldId id="279" r:id="rId7"/>
+    <p:sldId id="277" r:id="rId8"/>
+    <p:sldId id="278" r:id="rId9"/>
   </p:sldIdLst>
   <p:sldSz cx="12192000" cy="6858000"/>
   <p:notesSz cx="6858000" cy="9144000"/>
@@ -265,7 +266,7 @@
           <a:p>
             <a:fld id="{EED1C14C-A143-42F5-B247-D0E800131009}" type="datetimeFigureOut">
               <a:rPr lang="en-US" smtClean="0"/>
-              <a:t>11/8/2022</a:t>
+              <a:t>11/24/2022</a:t>
             </a:fld>
             <a:endParaRPr lang="en-US"/>
           </a:p>
@@ -463,7 +464,7 @@
           <a:p>
             <a:fld id="{EED1C14C-A143-42F5-B247-D0E800131009}" type="datetimeFigureOut">
               <a:rPr lang="en-US" smtClean="0"/>
-              <a:t>11/8/2022</a:t>
+              <a:t>11/24/2022</a:t>
             </a:fld>
             <a:endParaRPr lang="en-US"/>
           </a:p>
@@ -671,7 +672,7 @@
           <a:p>
             <a:fld id="{EED1C14C-A143-42F5-B247-D0E800131009}" type="datetimeFigureOut">
               <a:rPr lang="en-US" smtClean="0"/>
-              <a:t>11/8/2022</a:t>
+              <a:t>11/24/2022</a:t>
             </a:fld>
             <a:endParaRPr lang="en-US"/>
           </a:p>
@@ -869,7 +870,7 @@
           <a:p>
             <a:fld id="{EED1C14C-A143-42F5-B247-D0E800131009}" type="datetimeFigureOut">
               <a:rPr lang="en-US" smtClean="0"/>
-              <a:t>11/8/2022</a:t>
+              <a:t>11/24/2022</a:t>
             </a:fld>
             <a:endParaRPr lang="en-US"/>
           </a:p>
@@ -1144,7 +1145,7 @@
           <a:p>
             <a:fld id="{EED1C14C-A143-42F5-B247-D0E800131009}" type="datetimeFigureOut">
               <a:rPr lang="en-US" smtClean="0"/>
-              <a:t>11/8/2022</a:t>
+              <a:t>11/24/2022</a:t>
             </a:fld>
             <a:endParaRPr lang="en-US"/>
           </a:p>
@@ -1409,7 +1410,7 @@
           <a:p>
             <a:fld id="{EED1C14C-A143-42F5-B247-D0E800131009}" type="datetimeFigureOut">
               <a:rPr lang="en-US" smtClean="0"/>
-              <a:t>11/8/2022</a:t>
+              <a:t>11/24/2022</a:t>
             </a:fld>
             <a:endParaRPr lang="en-US"/>
           </a:p>
@@ -1821,7 +1822,7 @@
           <a:p>
             <a:fld id="{EED1C14C-A143-42F5-B247-D0E800131009}" type="datetimeFigureOut">
               <a:rPr lang="en-US" smtClean="0"/>
-              <a:t>11/8/2022</a:t>
+              <a:t>11/24/2022</a:t>
             </a:fld>
             <a:endParaRPr lang="en-US"/>
           </a:p>
@@ -1962,7 +1963,7 @@
           <a:p>
             <a:fld id="{EED1C14C-A143-42F5-B247-D0E800131009}" type="datetimeFigureOut">
               <a:rPr lang="en-US" smtClean="0"/>
-              <a:t>11/8/2022</a:t>
+              <a:t>11/24/2022</a:t>
             </a:fld>
             <a:endParaRPr lang="en-US"/>
           </a:p>
@@ -2075,7 +2076,7 @@
           <a:p>
             <a:fld id="{EED1C14C-A143-42F5-B247-D0E800131009}" type="datetimeFigureOut">
               <a:rPr lang="en-US" smtClean="0"/>
-              <a:t>11/8/2022</a:t>
+              <a:t>11/24/2022</a:t>
             </a:fld>
             <a:endParaRPr lang="en-US"/>
           </a:p>
@@ -2386,7 +2387,7 @@
           <a:p>
             <a:fld id="{EED1C14C-A143-42F5-B247-D0E800131009}" type="datetimeFigureOut">
               <a:rPr lang="en-US" smtClean="0"/>
-              <a:t>11/8/2022</a:t>
+              <a:t>11/24/2022</a:t>
             </a:fld>
             <a:endParaRPr lang="en-US"/>
           </a:p>
@@ -2674,7 +2675,7 @@
           <a:p>
             <a:fld id="{EED1C14C-A143-42F5-B247-D0E800131009}" type="datetimeFigureOut">
               <a:rPr lang="en-US" smtClean="0"/>
-              <a:t>11/8/2022</a:t>
+              <a:t>11/24/2022</a:t>
             </a:fld>
             <a:endParaRPr lang="en-US"/>
           </a:p>
@@ -2915,7 +2916,7 @@
           <a:p>
             <a:fld id="{EED1C14C-A143-42F5-B247-D0E800131009}" type="datetimeFigureOut">
               <a:rPr lang="en-US" smtClean="0"/>
-              <a:t>11/8/2022</a:t>
+              <a:t>11/24/2022</a:t>
             </a:fld>
             <a:endParaRPr lang="en-US"/>
           </a:p>
@@ -3775,7 +3776,7 @@
           <a:p>
             <a:pPr algn="ctr"/>
             <a:r>
-              <a:rPr lang="en-US" sz="5400" dirty="0">
+              <a:rPr lang="en-US" sz="5400">
                 <a:solidFill>
                   <a:schemeClr val="bg1"/>
                 </a:solidFill>
@@ -3794,10 +3795,10 @@
       </p:sp>
       <p:pic>
         <p:nvPicPr>
-          <p:cNvPr id="3" name="slide2" descr="Sheet 1">
-            <a:extLst>
-              <a:ext uri="{FF2B5EF4-FFF2-40B4-BE49-F238E27FC236}">
-                <a16:creationId xmlns:a16="http://schemas.microsoft.com/office/drawing/2014/main" id="{1496D360-C660-A0EE-40E4-23321031CDCD}"/>
+          <p:cNvPr id="5" name="slide2" descr="Sheet 1">
+            <a:extLst>
+              <a:ext uri="{FF2B5EF4-FFF2-40B4-BE49-F238E27FC236}">
+                <a16:creationId xmlns:a16="http://schemas.microsoft.com/office/drawing/2014/main" id="{5C725DE1-B64C-5780-E8B3-FBA1DB3AF763}"/>
               </a:ext>
             </a:extLst>
           </p:cNvPr>
@@ -3820,8 +3821,8 @@
         </p:blipFill>
         <p:spPr>
           <a:xfrm>
-            <a:off x="1247492" y="2056505"/>
-            <a:ext cx="9697016" cy="4599933"/>
+            <a:off x="1068278" y="2046574"/>
+            <a:ext cx="10055443" cy="4520336"/>
           </a:xfrm>
           <a:prstGeom prst="rect">
             <a:avLst/>
@@ -3956,7 +3957,7 @@
           <a:p>
             <a:pPr algn="ctr"/>
             <a:r>
-              <a:rPr lang="en-US" sz="5400" dirty="0">
+              <a:rPr lang="en-US" sz="5400">
                 <a:solidFill>
                   <a:schemeClr val="bg1"/>
                 </a:solidFill>
@@ -3975,10 +3976,10 @@
       </p:sp>
       <p:pic>
         <p:nvPicPr>
-          <p:cNvPr id="4" name="slide2" descr="Sheet 1">
-            <a:extLst>
-              <a:ext uri="{FF2B5EF4-FFF2-40B4-BE49-F238E27FC236}">
-                <a16:creationId xmlns:a16="http://schemas.microsoft.com/office/drawing/2014/main" id="{8A936670-09F0-5C5B-5AA2-DB8C6144D8FE}"/>
+          <p:cNvPr id="3" name="slide2" descr="Sheet 1">
+            <a:extLst>
+              <a:ext uri="{FF2B5EF4-FFF2-40B4-BE49-F238E27FC236}">
+                <a16:creationId xmlns:a16="http://schemas.microsoft.com/office/drawing/2014/main" id="{F27051D8-B48A-61D8-3277-5E5AD8B70C64}"/>
               </a:ext>
             </a:extLst>
           </p:cNvPr>
@@ -4001,8 +4002,8 @@
         </p:blipFill>
         <p:spPr>
           <a:xfrm>
-            <a:off x="1489635" y="1997476"/>
-            <a:ext cx="9021240" cy="4732631"/>
+            <a:off x="1062210" y="2041118"/>
+            <a:ext cx="10067579" cy="4525792"/>
           </a:xfrm>
           <a:prstGeom prst="rect">
             <a:avLst/>
@@ -4012,7 +4013,7 @@
     </p:spTree>
     <p:extLst>
       <p:ext uri="{BB962C8B-B14F-4D97-AF65-F5344CB8AC3E}">
-        <p14:creationId xmlns:p14="http://schemas.microsoft.com/office/powerpoint/2010/main" val="3122284600"/>
+        <p14:creationId xmlns:p14="http://schemas.microsoft.com/office/powerpoint/2010/main" val="3117550585"/>
       </p:ext>
     </p:extLst>
   </p:cSld>
@@ -4159,7 +4160,7 @@
           <p:cNvPr id="4" name="slide2" descr="Sheet 1">
             <a:extLst>
               <a:ext uri="{FF2B5EF4-FFF2-40B4-BE49-F238E27FC236}">
-                <a16:creationId xmlns:a16="http://schemas.microsoft.com/office/drawing/2014/main" id="{E2A82F9F-CE5B-E2D6-8668-A6F658088C4A}"/>
+                <a16:creationId xmlns:a16="http://schemas.microsoft.com/office/drawing/2014/main" id="{8A936670-09F0-5C5B-5AA2-DB8C6144D8FE}"/>
               </a:ext>
             </a:extLst>
           </p:cNvPr>
@@ -4182,44 +4183,8 @@
         </p:blipFill>
         <p:spPr>
           <a:xfrm>
-            <a:off x="350805" y="4294239"/>
-            <a:ext cx="11490385" cy="1915064"/>
-          </a:xfrm>
-          <a:prstGeom prst="rect">
-            <a:avLst/>
-          </a:prstGeom>
-        </p:spPr>
-      </p:pic>
-      <p:pic>
-        <p:nvPicPr>
-          <p:cNvPr id="5" name="slide2" descr="Sheet 1">
-            <a:extLst>
-              <a:ext uri="{FF2B5EF4-FFF2-40B4-BE49-F238E27FC236}">
-                <a16:creationId xmlns:a16="http://schemas.microsoft.com/office/drawing/2014/main" id="{DF74EA65-4F63-4445-F51D-0CF83E58D423}"/>
-              </a:ext>
-            </a:extLst>
-          </p:cNvPr>
-          <p:cNvPicPr>
-            <a:picLocks noChangeAspect="1"/>
-          </p:cNvPicPr>
-          <p:nvPr/>
-        </p:nvPicPr>
-        <p:blipFill>
-          <a:blip r:embed="rId3">
-            <a:extLst>
-              <a:ext uri="{28A0092B-C50C-407E-A947-70E740481C1C}">
-                <a14:useLocalDpi xmlns:a14="http://schemas.microsoft.com/office/drawing/2010/main" val="0"/>
-              </a:ext>
-            </a:extLst>
-          </a:blip>
-          <a:stretch>
-            <a:fillRect/>
-          </a:stretch>
-        </p:blipFill>
-        <p:spPr>
-          <a:xfrm>
-            <a:off x="350808" y="2206154"/>
-            <a:ext cx="11490382" cy="1915064"/>
+            <a:off x="1489635" y="1997476"/>
+            <a:ext cx="9021240" cy="4732631"/>
           </a:xfrm>
           <a:prstGeom prst="rect">
             <a:avLst/>
@@ -4229,7 +4194,7 @@
     </p:spTree>
     <p:extLst>
       <p:ext uri="{BB962C8B-B14F-4D97-AF65-F5344CB8AC3E}">
-        <p14:creationId xmlns:p14="http://schemas.microsoft.com/office/powerpoint/2010/main" val="2225069643"/>
+        <p14:creationId xmlns:p14="http://schemas.microsoft.com/office/powerpoint/2010/main" val="3122284600"/>
       </p:ext>
     </p:extLst>
   </p:cSld>
@@ -4373,10 +4338,10 @@
       </p:sp>
       <p:pic>
         <p:nvPicPr>
-          <p:cNvPr id="3" name="slide2" descr="Sheet 1">
-            <a:extLst>
-              <a:ext uri="{FF2B5EF4-FFF2-40B4-BE49-F238E27FC236}">
-                <a16:creationId xmlns:a16="http://schemas.microsoft.com/office/drawing/2014/main" id="{86E185D1-254F-4F8E-925C-9379C3DBCF20}"/>
+          <p:cNvPr id="4" name="slide2" descr="Sheet 1">
+            <a:extLst>
+              <a:ext uri="{FF2B5EF4-FFF2-40B4-BE49-F238E27FC236}">
+                <a16:creationId xmlns:a16="http://schemas.microsoft.com/office/drawing/2014/main" id="{E2A82F9F-CE5B-E2D6-8668-A6F658088C4A}"/>
               </a:ext>
             </a:extLst>
           </p:cNvPr>
@@ -4399,8 +4364,8 @@
         </p:blipFill>
         <p:spPr>
           <a:xfrm>
-            <a:off x="395746" y="2002792"/>
-            <a:ext cx="11400503" cy="2527295"/>
+            <a:off x="350805" y="4294239"/>
+            <a:ext cx="11490385" cy="1915064"/>
           </a:xfrm>
           <a:prstGeom prst="rect">
             <a:avLst/>
@@ -4409,10 +4374,10 @@
       </p:pic>
       <p:pic>
         <p:nvPicPr>
-          <p:cNvPr id="4" name="slide2" descr="Sheet 1">
-            <a:extLst>
-              <a:ext uri="{FF2B5EF4-FFF2-40B4-BE49-F238E27FC236}">
-                <a16:creationId xmlns:a16="http://schemas.microsoft.com/office/drawing/2014/main" id="{E45C4A3C-A7C7-84FF-8E04-FCB9D2EC9877}"/>
+          <p:cNvPr id="5" name="slide2" descr="Sheet 1">
+            <a:extLst>
+              <a:ext uri="{FF2B5EF4-FFF2-40B4-BE49-F238E27FC236}">
+                <a16:creationId xmlns:a16="http://schemas.microsoft.com/office/drawing/2014/main" id="{DF74EA65-4F63-4445-F51D-0CF83E58D423}"/>
               </a:ext>
             </a:extLst>
           </p:cNvPr>
@@ -4435,8 +4400,8 @@
         </p:blipFill>
         <p:spPr>
           <a:xfrm>
-            <a:off x="395746" y="4530087"/>
-            <a:ext cx="11633200" cy="2265148"/>
+            <a:off x="350808" y="2206154"/>
+            <a:ext cx="11490382" cy="1915064"/>
           </a:xfrm>
           <a:prstGeom prst="rect">
             <a:avLst/>
@@ -4446,7 +4411,7 @@
     </p:spTree>
     <p:extLst>
       <p:ext uri="{BB962C8B-B14F-4D97-AF65-F5344CB8AC3E}">
-        <p14:creationId xmlns:p14="http://schemas.microsoft.com/office/powerpoint/2010/main" val="705157631"/>
+        <p14:creationId xmlns:p14="http://schemas.microsoft.com/office/powerpoint/2010/main" val="2225069643"/>
       </p:ext>
     </p:extLst>
   </p:cSld>
@@ -4593,6 +4558,223 @@
           <p:cNvPr id="3" name="slide2" descr="Sheet 1">
             <a:extLst>
               <a:ext uri="{FF2B5EF4-FFF2-40B4-BE49-F238E27FC236}">
+                <a16:creationId xmlns:a16="http://schemas.microsoft.com/office/drawing/2014/main" id="{86E185D1-254F-4F8E-925C-9379C3DBCF20}"/>
+              </a:ext>
+            </a:extLst>
+          </p:cNvPr>
+          <p:cNvPicPr>
+            <a:picLocks noChangeAspect="1"/>
+          </p:cNvPicPr>
+          <p:nvPr/>
+        </p:nvPicPr>
+        <p:blipFill>
+          <a:blip r:embed="rId2">
+            <a:extLst>
+              <a:ext uri="{28A0092B-C50C-407E-A947-70E740481C1C}">
+                <a14:useLocalDpi xmlns:a14="http://schemas.microsoft.com/office/drawing/2010/main" val="0"/>
+              </a:ext>
+            </a:extLst>
+          </a:blip>
+          <a:stretch>
+            <a:fillRect/>
+          </a:stretch>
+        </p:blipFill>
+        <p:spPr>
+          <a:xfrm>
+            <a:off x="395746" y="2002792"/>
+            <a:ext cx="11400503" cy="2527295"/>
+          </a:xfrm>
+          <a:prstGeom prst="rect">
+            <a:avLst/>
+          </a:prstGeom>
+        </p:spPr>
+      </p:pic>
+      <p:pic>
+        <p:nvPicPr>
+          <p:cNvPr id="4" name="slide2" descr="Sheet 1">
+            <a:extLst>
+              <a:ext uri="{FF2B5EF4-FFF2-40B4-BE49-F238E27FC236}">
+                <a16:creationId xmlns:a16="http://schemas.microsoft.com/office/drawing/2014/main" id="{E45C4A3C-A7C7-84FF-8E04-FCB9D2EC9877}"/>
+              </a:ext>
+            </a:extLst>
+          </p:cNvPr>
+          <p:cNvPicPr>
+            <a:picLocks noChangeAspect="1"/>
+          </p:cNvPicPr>
+          <p:nvPr/>
+        </p:nvPicPr>
+        <p:blipFill>
+          <a:blip r:embed="rId3">
+            <a:extLst>
+              <a:ext uri="{28A0092B-C50C-407E-A947-70E740481C1C}">
+                <a14:useLocalDpi xmlns:a14="http://schemas.microsoft.com/office/drawing/2010/main" val="0"/>
+              </a:ext>
+            </a:extLst>
+          </a:blip>
+          <a:stretch>
+            <a:fillRect/>
+          </a:stretch>
+        </p:blipFill>
+        <p:spPr>
+          <a:xfrm>
+            <a:off x="395746" y="4530087"/>
+            <a:ext cx="11633200" cy="2265148"/>
+          </a:xfrm>
+          <a:prstGeom prst="rect">
+            <a:avLst/>
+          </a:prstGeom>
+        </p:spPr>
+      </p:pic>
+    </p:spTree>
+    <p:extLst>
+      <p:ext uri="{BB962C8B-B14F-4D97-AF65-F5344CB8AC3E}">
+        <p14:creationId xmlns:p14="http://schemas.microsoft.com/office/powerpoint/2010/main" val="705157631"/>
+      </p:ext>
+    </p:extLst>
+  </p:cSld>
+  <p:clrMapOvr>
+    <a:masterClrMapping/>
+  </p:clrMapOvr>
+</p:sld>
+</file>
+
+<file path=ppt/slides/slide7.xml><?xml version="1.0" encoding="utf-8"?>
+<p:sld xmlns:a="http://schemas.openxmlformats.org/drawingml/2006/main" xmlns:r="http://schemas.openxmlformats.org/officeDocument/2006/relationships" xmlns:p="http://schemas.openxmlformats.org/presentationml/2006/main">
+  <p:cSld>
+    <p:bg>
+      <p:bgPr>
+        <a:solidFill>
+          <a:schemeClr val="bg1"/>
+        </a:solidFill>
+        <a:effectLst/>
+      </p:bgPr>
+    </p:bg>
+    <p:spTree>
+      <p:nvGrpSpPr>
+        <p:cNvPr id="1" name=""/>
+        <p:cNvGrpSpPr/>
+        <p:nvPr/>
+      </p:nvGrpSpPr>
+      <p:grpSpPr>
+        <a:xfrm>
+          <a:off x="0" y="0"/>
+          <a:ext cx="0" cy="0"/>
+          <a:chOff x="0" y="0"/>
+          <a:chExt cx="0" cy="0"/>
+        </a:xfrm>
+      </p:grpSpPr>
+      <p:sp>
+        <p:nvSpPr>
+          <p:cNvPr id="38" name="Rectangle 37">
+            <a:extLst>
+              <a:ext uri="{FF2B5EF4-FFF2-40B4-BE49-F238E27FC236}">
+                <a16:creationId xmlns:a16="http://schemas.microsoft.com/office/drawing/2014/main" id="{D4D28E87-62D2-4602-B72F-5F74AA236CC3}"/>
+              </a:ext>
+              <a:ext uri="{C183D7F6-B498-43B3-948B-1728B52AA6E4}">
+                <adec:decorative xmlns:adec="http://schemas.microsoft.com/office/drawing/2017/decorative" val="1"/>
+              </a:ext>
+            </a:extLst>
+          </p:cNvPr>
+          <p:cNvSpPr>
+            <a:spLocks noGrp="1" noRot="1" noChangeAspect="1" noMove="1" noResize="1" noEditPoints="1" noAdjustHandles="1" noChangeArrowheads="1" noChangeShapeType="1" noTextEdit="1"/>
+          </p:cNvSpPr>
+          <p:nvPr>
+            <p:extLst>
+              <p:ext uri="{386F3935-93C4-4BCD-93E2-E3B085C9AB24}">
+                <p16:designElem xmlns:p16="http://schemas.microsoft.com/office/powerpoint/2015/main" val="1"/>
+              </p:ext>
+            </p:extLst>
+          </p:nvPr>
+        </p:nvSpPr>
+        <p:spPr>
+          <a:xfrm>
+            <a:off x="-1" y="0"/>
+            <a:ext cx="12192001" cy="1915064"/>
+          </a:xfrm>
+          <a:prstGeom prst="rect">
+            <a:avLst/>
+          </a:prstGeom>
+          <a:ln>
+            <a:noFill/>
+          </a:ln>
+        </p:spPr>
+        <p:style>
+          <a:lnRef idx="2">
+            <a:schemeClr val="accent1">
+              <a:shade val="50000"/>
+            </a:schemeClr>
+          </a:lnRef>
+          <a:fillRef idx="1">
+            <a:schemeClr val="accent1"/>
+          </a:fillRef>
+          <a:effectRef idx="0">
+            <a:schemeClr val="accent1"/>
+          </a:effectRef>
+          <a:fontRef idx="minor">
+            <a:schemeClr val="lt1"/>
+          </a:fontRef>
+        </p:style>
+        <p:txBody>
+          <a:bodyPr rtlCol="0" anchor="ctr"/>
+          <a:lstStyle/>
+          <a:p>
+            <a:pPr algn="ctr"/>
+            <a:endParaRPr lang="en-US" dirty="0"/>
+          </a:p>
+        </p:txBody>
+      </p:sp>
+      <p:sp>
+        <p:nvSpPr>
+          <p:cNvPr id="2" name="Title 1">
+            <a:extLst>
+              <a:ext uri="{FF2B5EF4-FFF2-40B4-BE49-F238E27FC236}">
+                <a16:creationId xmlns:a16="http://schemas.microsoft.com/office/drawing/2014/main" id="{794CA3EB-7882-2C24-1555-BFA6FDDFBA33}"/>
+              </a:ext>
+            </a:extLst>
+          </p:cNvPr>
+          <p:cNvSpPr>
+            <a:spLocks noGrp="1"/>
+          </p:cNvSpPr>
+          <p:nvPr>
+            <p:ph type="title"/>
+          </p:nvPr>
+        </p:nvSpPr>
+        <p:spPr>
+          <a:xfrm>
+            <a:off x="838199" y="291090"/>
+            <a:ext cx="10515599" cy="932688"/>
+          </a:xfrm>
+        </p:spPr>
+        <p:txBody>
+          <a:bodyPr vert="horz" lIns="91440" tIns="45720" rIns="91440" bIns="45720" rtlCol="0" anchor="b">
+            <a:normAutofit/>
+          </a:bodyPr>
+          <a:lstStyle/>
+          <a:p>
+            <a:pPr algn="ctr"/>
+            <a:r>
+              <a:rPr lang="en-US" sz="5400" dirty="0">
+                <a:solidFill>
+                  <a:schemeClr val="bg1"/>
+                </a:solidFill>
+              </a:rPr>
+              <a:t>Police Report Data</a:t>
+            </a:r>
+            <a:endParaRPr lang="en-US" dirty="0">
+              <a:solidFill>
+                <a:schemeClr val="bg1"/>
+              </a:solidFill>
+              <a:ea typeface="+mj-ea"/>
+              <a:cs typeface="+mj-cs"/>
+            </a:endParaRPr>
+          </a:p>
+        </p:txBody>
+      </p:sp>
+      <p:pic>
+        <p:nvPicPr>
+          <p:cNvPr id="3" name="slide2" descr="Sheet 1">
+            <a:extLst>
+              <a:ext uri="{FF2B5EF4-FFF2-40B4-BE49-F238E27FC236}">
                 <a16:creationId xmlns:a16="http://schemas.microsoft.com/office/drawing/2014/main" id="{BED909CF-EAB7-B5C6-1923-7785F12EC652}"/>
               </a:ext>
             </a:extLst>
@@ -4673,7 +4855,7 @@
 </p:sld>
 </file>
 
-<file path=ppt/slides/slide7.xml><?xml version="1.0" encoding="utf-8"?>
+<file path=ppt/slides/slide8.xml><?xml version="1.0" encoding="utf-8"?>
 <p:sld xmlns:a="http://schemas.openxmlformats.org/drawingml/2006/main" xmlns:r="http://schemas.openxmlformats.org/officeDocument/2006/relationships" xmlns:p="http://schemas.openxmlformats.org/presentationml/2006/main">
   <p:cSld>
     <p:bg>

</xml_diff>